<commit_message>
add ethics doc classifier
</commit_message>
<xml_diff>
--- a/student_lessons/C_Sentiment_Unsupervised/Day3_liveB_ClusteringReview.pptx
+++ b/student_lessons/C_Sentiment_Unsupervised/Day3_liveB_ClusteringReview.pptx
@@ -15189,7 +15189,7 @@
           <a:p>
             <a:fld id="{B0C0A60C-850A-4EA4-9C14-A8FE98B94505}" type="datetimeFigureOut">
               <a:rPr lang="en-US" smtClean="0"/>
-              <a:t>6/15/21</a:t>
+              <a:t>12/31/21</a:t>
             </a:fld>
             <a:endParaRPr lang="en-US"/>
           </a:p>
@@ -15588,7 +15588,7 @@
           <a:p>
             <a:fld id="{5738B90E-0779-4C36-915C-6F05FCD89456}" type="datetime1">
               <a:rPr lang="en-US" smtClean="0"/>
-              <a:t>6/15/21</a:t>
+              <a:t>12/31/21</a:t>
             </a:fld>
             <a:endParaRPr lang="en-US"/>
           </a:p>
@@ -15785,7 +15785,7 @@
           <a:p>
             <a:fld id="{7B9EA29D-D431-42FE-B7B6-AAE4454C77D3}" type="datetime1">
               <a:rPr lang="en-US" smtClean="0"/>
-              <a:t>6/15/21</a:t>
+              <a:t>12/31/21</a:t>
             </a:fld>
             <a:endParaRPr lang="en-US"/>
           </a:p>
@@ -16140,7 +16140,7 @@
           <a:p>
             <a:fld id="{690D8A1E-EA8F-46C1-B891-AE0C00D9C314}" type="datetime1">
               <a:rPr lang="en-US" smtClean="0"/>
-              <a:t>6/15/21</a:t>
+              <a:t>12/31/21</a:t>
             </a:fld>
             <a:endParaRPr lang="en-US"/>
           </a:p>
@@ -16448,7 +16448,7 @@
           <a:p>
             <a:fld id="{D753EFC8-4232-4598-94F6-94C0EBAFC469}" type="datetime1">
               <a:rPr lang="en-US" smtClean="0"/>
-              <a:t>6/15/21</a:t>
+              <a:t>12/31/21</a:t>
             </a:fld>
             <a:endParaRPr lang="en-US"/>
           </a:p>
@@ -16777,7 +16777,7 @@
           <a:p>
             <a:fld id="{F3161074-1C18-4AE7-957D-F18524378C85}" type="datetime1">
               <a:rPr lang="en-US" smtClean="0"/>
-              <a:t>6/15/21</a:t>
+              <a:t>12/31/21</a:t>
             </a:fld>
             <a:endParaRPr lang="en-US"/>
           </a:p>
@@ -17030,7 +17030,7 @@
           <a:p>
             <a:fld id="{69BE256C-8D9A-4404-B47D-41A1AE514425}" type="datetime1">
               <a:rPr lang="en-US" smtClean="0"/>
-              <a:t>6/15/21</a:t>
+              <a:t>12/31/21</a:t>
             </a:fld>
             <a:endParaRPr lang="en-US"/>
           </a:p>
@@ -17478,7 +17478,7 @@
           <a:p>
             <a:fld id="{66CB2154-9035-4012-8189-BAAB61C5A5EE}" type="datetime1">
               <a:rPr lang="en-US" smtClean="0"/>
-              <a:t>6/15/21</a:t>
+              <a:t>12/31/21</a:t>
             </a:fld>
             <a:endParaRPr lang="en-US"/>
           </a:p>
@@ -17666,7 +17666,7 @@
           <a:p>
             <a:fld id="{6700A58B-DD98-43D0-B791-721480A02982}" type="datetime1">
               <a:rPr lang="en-US" smtClean="0"/>
-              <a:t>6/15/21</a:t>
+              <a:t>12/31/21</a:t>
             </a:fld>
             <a:endParaRPr lang="en-US"/>
           </a:p>
@@ -17872,7 +17872,7 @@
           <a:p>
             <a:fld id="{7DB6E382-4F61-4E24-BE1A-377EC83D0E3A}" type="datetime1">
               <a:rPr lang="en-US" smtClean="0"/>
-              <a:t>6/15/21</a:t>
+              <a:t>12/31/21</a:t>
             </a:fld>
             <a:endParaRPr lang="en-US"/>
           </a:p>
@@ -18278,7 +18278,7 @@
           <a:p>
             <a:fld id="{4142EED6-FC16-45B9-B8C4-2BC5DBA88325}" type="datetime1">
               <a:rPr lang="en-US" smtClean="0"/>
-              <a:t>6/15/21</a:t>
+              <a:t>12/31/21</a:t>
             </a:fld>
             <a:endParaRPr lang="en-US"/>
           </a:p>
@@ -18610,7 +18610,7 @@
           <a:p>
             <a:fld id="{DF59512B-4F1D-43D7-8819-2F53FEF69650}" type="datetime1">
               <a:rPr lang="en-US" smtClean="0"/>
-              <a:t>6/15/21</a:t>
+              <a:t>12/31/21</a:t>
             </a:fld>
             <a:endParaRPr lang="en-US"/>
           </a:p>
@@ -18900,7 +18900,7 @@
           <a:p>
             <a:fld id="{08437B94-E2BF-44DC-ADC5-B05FC9934E9D}" type="datetime1">
               <a:rPr lang="en-US" smtClean="0"/>
-              <a:t>6/15/21</a:t>
+              <a:t>12/31/21</a:t>
             </a:fld>
             <a:endParaRPr lang="en-US"/>
           </a:p>
@@ -19424,7 +19424,7 @@
             <a:fld id="{5738B90E-0779-4C36-915C-6F05FCD89456}" type="datetime1">
               <a:rPr lang="en-US" smtClean="0"/>
               <a:pPr/>
-              <a:t>6/15/21</a:t>
+              <a:t>12/31/21</a:t>
             </a:fld>
             <a:endParaRPr lang="en-US"/>
           </a:p>
@@ -19616,7 +19616,7 @@
           <a:p>
             <a:fld id="{6700A58B-DD98-43D0-B791-721480A02982}" type="datetime1">
               <a:rPr lang="en-US" smtClean="0"/>
-              <a:t>6/15/21</a:t>
+              <a:t>12/31/21</a:t>
             </a:fld>
             <a:endParaRPr lang="en-US"/>
           </a:p>
@@ -19934,7 +19934,7 @@
           <a:p>
             <a:fld id="{6700A58B-DD98-43D0-B791-721480A02982}" type="datetime1">
               <a:rPr lang="en-US" smtClean="0"/>
-              <a:t>6/15/21</a:t>
+              <a:t>12/31/21</a:t>
             </a:fld>
             <a:endParaRPr lang="en-US"/>
           </a:p>
@@ -20251,7 +20251,7 @@
           <a:p>
             <a:fld id="{6700A58B-DD98-43D0-B791-721480A02982}" type="datetime1">
               <a:rPr lang="en-US" smtClean="0"/>
-              <a:t>6/15/21</a:t>
+              <a:t>12/31/21</a:t>
             </a:fld>
             <a:endParaRPr lang="en-US"/>
           </a:p>
@@ -20535,7 +20535,7 @@
           <a:p>
             <a:fld id="{6700A58B-DD98-43D0-B791-721480A02982}" type="datetime1">
               <a:rPr lang="en-US" smtClean="0"/>
-              <a:t>6/15/21</a:t>
+              <a:t>12/31/21</a:t>
             </a:fld>
             <a:endParaRPr lang="en-US"/>
           </a:p>
@@ -21021,7 +21021,7 @@
           <a:p>
             <a:fld id="{6700A58B-DD98-43D0-B791-721480A02982}" type="datetime1">
               <a:rPr lang="en-US" smtClean="0"/>
-              <a:t>6/15/21</a:t>
+              <a:t>12/31/21</a:t>
             </a:fld>
             <a:endParaRPr lang="en-US"/>
           </a:p>
@@ -21287,7 +21287,7 @@
           <a:p>
             <a:fld id="{6700A58B-DD98-43D0-B791-721480A02982}" type="datetime1">
               <a:rPr lang="en-US" smtClean="0"/>
-              <a:t>6/15/21</a:t>
+              <a:t>12/31/21</a:t>
             </a:fld>
             <a:endParaRPr lang="en-US"/>
           </a:p>
@@ -21667,7 +21667,7 @@
           <a:p>
             <a:fld id="{6700A58B-DD98-43D0-B791-721480A02982}" type="datetime1">
               <a:rPr lang="en-US" smtClean="0"/>
-              <a:t>6/15/21</a:t>
+              <a:t>12/31/21</a:t>
             </a:fld>
             <a:endParaRPr lang="en-US"/>
           </a:p>
@@ -21818,7 +21818,7 @@
           <a:p>
             <a:fld id="{6700A58B-DD98-43D0-B791-721480A02982}" type="datetime1">
               <a:rPr lang="en-US" smtClean="0"/>
-              <a:t>6/15/21</a:t>
+              <a:t>12/31/21</a:t>
             </a:fld>
             <a:endParaRPr lang="en-US"/>
           </a:p>
@@ -21964,7 +21964,7 @@
           <a:p>
             <a:fld id="{6700A58B-DD98-43D0-B791-721480A02982}" type="datetime1">
               <a:rPr lang="en-US" smtClean="0"/>
-              <a:t>6/15/21</a:t>
+              <a:t>12/31/21</a:t>
             </a:fld>
             <a:endParaRPr lang="en-US"/>
           </a:p>
@@ -22675,7 +22675,7 @@
           <a:graphicData uri="http://schemas.openxmlformats.org/presentationml/2006/ole">
             <mc:AlternateContent xmlns:mc="http://schemas.openxmlformats.org/markup-compatibility/2006">
               <mc:Choice xmlns:v="urn:schemas-microsoft-com:vml" Requires="v">
-                <p:oleObj spid="_x0000_s3079" name="Document" r:id="rId3" imgW="2858268" imgH="544757" progId="Word.Document.12">
+                <p:oleObj spid="_x0000_s3080" name="Document" r:id="rId3" imgW="2858268" imgH="544757" progId="Word.Document.12">
                   <p:embed/>
                 </p:oleObj>
               </mc:Choice>
@@ -22769,7 +22769,7 @@
           <a:p>
             <a:fld id="{6700A58B-DD98-43D0-B791-721480A02982}" type="datetime1">
               <a:rPr lang="en-US" smtClean="0"/>
-              <a:t>6/15/21</a:t>
+              <a:t>12/31/21</a:t>
             </a:fld>
             <a:endParaRPr lang="en-US"/>
           </a:p>
@@ -23340,7 +23340,7 @@
           <a:p>
             <a:fld id="{6700A58B-DD98-43D0-B791-721480A02982}" type="datetime1">
               <a:rPr lang="en-US" smtClean="0"/>
-              <a:t>6/15/21</a:t>
+              <a:t>12/31/21</a:t>
             </a:fld>
             <a:endParaRPr lang="en-US"/>
           </a:p>
@@ -25675,7 +25675,7 @@
           <a:p>
             <a:fld id="{6700A58B-DD98-43D0-B791-721480A02982}" type="datetime1">
               <a:rPr lang="en-US" smtClean="0"/>
-              <a:t>6/15/21</a:t>
+              <a:t>12/31/21</a:t>
             </a:fld>
             <a:endParaRPr lang="en-US"/>
           </a:p>
@@ -26688,7 +26688,7 @@
           <a:p>
             <a:fld id="{6700A58B-DD98-43D0-B791-721480A02982}" type="datetime1">
               <a:rPr lang="en-US" smtClean="0"/>
-              <a:t>6/15/21</a:t>
+              <a:t>12/31/21</a:t>
             </a:fld>
             <a:endParaRPr lang="en-US"/>
           </a:p>
@@ -27190,7 +27190,7 @@
             <a:fld id="{6700A58B-DD98-43D0-B791-721480A02982}" type="datetime1">
               <a:rPr lang="en-US" smtClean="0"/>
               <a:pPr/>
-              <a:t>6/15/21</a:t>
+              <a:t>12/31/21</a:t>
             </a:fld>
             <a:endParaRPr lang="en-US"/>
           </a:p>
@@ -27795,7 +27795,7 @@
             <a:fld id="{6700A58B-DD98-43D0-B791-721480A02982}" type="datetime1">
               <a:rPr lang="en-US" smtClean="0"/>
               <a:pPr/>
-              <a:t>6/15/21</a:t>
+              <a:t>12/31/21</a:t>
             </a:fld>
             <a:endParaRPr lang="en-US"/>
           </a:p>
@@ -28439,7 +28439,7 @@
             <a:fld id="{6700A58B-DD98-43D0-B791-721480A02982}" type="datetime1">
               <a:rPr lang="en-US" smtClean="0"/>
               <a:pPr/>
-              <a:t>6/15/21</a:t>
+              <a:t>12/31/21</a:t>
             </a:fld>
             <a:endParaRPr lang="en-US"/>
           </a:p>
@@ -29228,7 +29228,7 @@
             <a:fld id="{6700A58B-DD98-43D0-B791-721480A02982}" type="datetime1">
               <a:rPr lang="en-US" smtClean="0"/>
               <a:pPr/>
-              <a:t>6/15/21</a:t>
+              <a:t>12/31/21</a:t>
             </a:fld>
             <a:endParaRPr lang="en-US"/>
           </a:p>
@@ -30022,7 +30022,7 @@
           <a:p>
             <a:fld id="{6700A58B-DD98-43D0-B791-721480A02982}" type="datetime1">
               <a:rPr lang="en-US" smtClean="0"/>
-              <a:t>6/15/21</a:t>
+              <a:t>12/31/21</a:t>
             </a:fld>
             <a:endParaRPr lang="en-US"/>
           </a:p>
@@ -30774,7 +30774,7 @@
             <a:fld id="{6700A58B-DD98-43D0-B791-721480A02982}" type="datetime1">
               <a:rPr lang="en-US" smtClean="0"/>
               <a:pPr/>
-              <a:t>6/15/21</a:t>
+              <a:t>12/31/21</a:t>
             </a:fld>
             <a:endParaRPr lang="en-US"/>
           </a:p>
@@ -31752,7 +31752,7 @@
             <a:fld id="{6700A58B-DD98-43D0-B791-721480A02982}" type="datetime1">
               <a:rPr lang="en-US" smtClean="0"/>
               <a:pPr/>
-              <a:t>6/15/21</a:t>
+              <a:t>12/31/21</a:t>
             </a:fld>
             <a:endParaRPr lang="en-US"/>
           </a:p>
@@ -32418,7 +32418,7 @@
           <a:p>
             <a:fld id="{6700A58B-DD98-43D0-B791-721480A02982}" type="datetime1">
               <a:rPr lang="en-US" smtClean="0"/>
-              <a:t>6/15/21</a:t>
+              <a:t>12/31/21</a:t>
             </a:fld>
             <a:endParaRPr lang="en-US"/>
           </a:p>
@@ -32998,7 +32998,7 @@
           <a:p>
             <a:fld id="{6700A58B-DD98-43D0-B791-721480A02982}" type="datetime1">
               <a:rPr lang="en-US" smtClean="0"/>
-              <a:t>6/15/21</a:t>
+              <a:t>12/31/21</a:t>
             </a:fld>
             <a:endParaRPr lang="en-US"/>
           </a:p>
@@ -33470,7 +33470,7 @@
           <a:p>
             <a:fld id="{6700A58B-DD98-43D0-B791-721480A02982}" type="datetime1">
               <a:rPr lang="en-US" smtClean="0"/>
-              <a:t>6/15/21</a:t>
+              <a:t>12/31/21</a:t>
             </a:fld>
             <a:endParaRPr lang="en-US"/>
           </a:p>
@@ -33753,7 +33753,7 @@
           <a:p>
             <a:fld id="{6700A58B-DD98-43D0-B791-721480A02982}" type="datetime1">
               <a:rPr lang="en-US" smtClean="0"/>
-              <a:t>6/16/21</a:t>
+              <a:t>12/31/21</a:t>
             </a:fld>
             <a:endParaRPr lang="en-US"/>
           </a:p>
@@ -34096,7 +34096,7 @@
           <a:p>
             <a:fld id="{6700A58B-DD98-43D0-B791-721480A02982}" type="datetime1">
               <a:rPr lang="en-US" smtClean="0"/>
-              <a:t>6/16/21</a:t>
+              <a:t>12/31/21</a:t>
             </a:fld>
             <a:endParaRPr lang="en-US"/>
           </a:p>
@@ -34490,7 +34490,7 @@
           <a:p>
             <a:fld id="{6700A58B-DD98-43D0-B791-721480A02982}" type="datetime1">
               <a:rPr lang="en-US" smtClean="0"/>
-              <a:t>6/16/21</a:t>
+              <a:t>12/31/21</a:t>
             </a:fld>
             <a:endParaRPr lang="en-US"/>
           </a:p>
@@ -34938,7 +34938,7 @@
           <a:p>
             <a:fld id="{6700A58B-DD98-43D0-B791-721480A02982}" type="datetime1">
               <a:rPr lang="en-US" smtClean="0"/>
-              <a:t>6/16/21</a:t>
+              <a:t>12/31/21</a:t>
             </a:fld>
             <a:endParaRPr lang="en-US"/>
           </a:p>
@@ -36003,7 +36003,7 @@
           <a:p>
             <a:fld id="{6700A58B-DD98-43D0-B791-721480A02982}" type="datetime1">
               <a:rPr lang="en-US" smtClean="0"/>
-              <a:t>6/16/21</a:t>
+              <a:t>12/31/21</a:t>
             </a:fld>
             <a:endParaRPr lang="en-US"/>
           </a:p>
@@ -36945,7 +36945,7 @@
           <a:p>
             <a:fld id="{6700A58B-DD98-43D0-B791-721480A02982}" type="datetime1">
               <a:rPr lang="en-US" smtClean="0"/>
-              <a:t>6/16/21</a:t>
+              <a:t>12/31/21</a:t>
             </a:fld>
             <a:endParaRPr lang="en-US"/>
           </a:p>
@@ -37789,7 +37789,7 @@
           <a:p>
             <a:fld id="{6700A58B-DD98-43D0-B791-721480A02982}" type="datetime1">
               <a:rPr lang="en-US" smtClean="0"/>
-              <a:t>6/16/21</a:t>
+              <a:t>12/31/21</a:t>
             </a:fld>
             <a:endParaRPr lang="en-US"/>
           </a:p>
@@ -38512,7 +38512,7 @@
           <a:p>
             <a:fld id="{6700A58B-DD98-43D0-B791-721480A02982}" type="datetime1">
               <a:rPr lang="en-US" smtClean="0"/>
-              <a:t>6/16/21</a:t>
+              <a:t>12/31/21</a:t>
             </a:fld>
             <a:endParaRPr lang="en-US"/>
           </a:p>
@@ -39390,7 +39390,7 @@
           <a:p>
             <a:fld id="{6700A58B-DD98-43D0-B791-721480A02982}" type="datetime1">
               <a:rPr lang="en-US" smtClean="0"/>
-              <a:t>6/16/21</a:t>
+              <a:t>12/31/21</a:t>
             </a:fld>
             <a:endParaRPr lang="en-US"/>
           </a:p>
@@ -39936,7 +39936,7 @@
           <a:p>
             <a:fld id="{6700A58B-DD98-43D0-B791-721480A02982}" type="datetime1">
               <a:rPr lang="en-US" smtClean="0"/>
-              <a:t>6/15/21</a:t>
+              <a:t>12/31/21</a:t>
             </a:fld>
             <a:endParaRPr lang="en-US"/>
           </a:p>
@@ -40414,7 +40414,7 @@
           <a:p>
             <a:fld id="{6700A58B-DD98-43D0-B791-721480A02982}" type="datetime1">
               <a:rPr lang="en-US" smtClean="0"/>
-              <a:t>6/16/21</a:t>
+              <a:t>12/31/21</a:t>
             </a:fld>
             <a:endParaRPr lang="en-US"/>
           </a:p>
@@ -40976,7 +40976,7 @@
           <a:p>
             <a:fld id="{6700A58B-DD98-43D0-B791-721480A02982}" type="datetime1">
               <a:rPr lang="en-US" smtClean="0"/>
-              <a:t>6/16/21</a:t>
+              <a:t>12/31/21</a:t>
             </a:fld>
             <a:endParaRPr lang="en-US"/>
           </a:p>
@@ -41346,7 +41346,7 @@
           <a:p>
             <a:fld id="{6700A58B-DD98-43D0-B791-721480A02982}" type="datetime1">
               <a:rPr lang="en-US" smtClean="0"/>
-              <a:t>6/16/21</a:t>
+              <a:t>12/31/21</a:t>
             </a:fld>
             <a:endParaRPr lang="en-US"/>
           </a:p>
@@ -41918,7 +41918,7 @@
                   <a:spcPts val="600"/>
                 </a:spcAft>
               </a:pPr>
-              <a:t>6/15/21</a:t>
+              <a:t>12/31/21</a:t>
             </a:fld>
             <a:endParaRPr lang="en-US" sz="1200"/>
           </a:p>
@@ -42380,7 +42380,7 @@
                 </a:spcAft>
                 <a:defRPr/>
               </a:pPr>
-              <a:t>6/16/21</a:t>
+              <a:t>12/31/21</a:t>
             </a:fld>
             <a:endParaRPr lang="en-US" sz="1200">
               <a:solidFill>
@@ -42618,7 +42618,7 @@
           <a:p>
             <a:fld id="{6700A58B-DD98-43D0-B791-721480A02982}" type="datetime1">
               <a:rPr lang="en-US" smtClean="0"/>
-              <a:t>6/16/21</a:t>
+              <a:t>12/31/21</a:t>
             </a:fld>
             <a:endParaRPr lang="en-US"/>
           </a:p>
@@ -42990,7 +42990,7 @@
           <a:p>
             <a:fld id="{6700A58B-DD98-43D0-B791-721480A02982}" type="datetime1">
               <a:rPr lang="en-US" smtClean="0"/>
-              <a:t>6/15/21</a:t>
+              <a:t>12/31/21</a:t>
             </a:fld>
             <a:endParaRPr lang="en-US"/>
           </a:p>
@@ -43303,7 +43303,7 @@
           <a:p>
             <a:fld id="{6700A58B-DD98-43D0-B791-721480A02982}" type="datetime1">
               <a:rPr lang="en-US" smtClean="0"/>
-              <a:t>6/15/21</a:t>
+              <a:t>12/31/21</a:t>
             </a:fld>
             <a:endParaRPr lang="en-US"/>
           </a:p>
@@ -43715,7 +43715,7 @@
           <a:p>
             <a:fld id="{6700A58B-DD98-43D0-B791-721480A02982}" type="datetime1">
               <a:rPr lang="en-US" smtClean="0"/>
-              <a:t>6/15/21</a:t>
+              <a:t>12/31/21</a:t>
             </a:fld>
             <a:endParaRPr lang="en-US"/>
           </a:p>
@@ -44255,7 +44255,7 @@
           <a:p>
             <a:fld id="{6700A58B-DD98-43D0-B791-721480A02982}" type="datetime1">
               <a:rPr lang="en-US" smtClean="0"/>
-              <a:t>6/15/21</a:t>
+              <a:t>12/31/21</a:t>
             </a:fld>
             <a:endParaRPr lang="en-US"/>
           </a:p>
@@ -44714,7 +44714,7 @@
           <a:p>
             <a:fld id="{6700A58B-DD98-43D0-B791-721480A02982}" type="datetime1">
               <a:rPr lang="en-US" smtClean="0"/>
-              <a:t>6/15/21</a:t>
+              <a:t>12/31/21</a:t>
             </a:fld>
             <a:endParaRPr lang="en-US"/>
           </a:p>

</xml_diff>